<commit_message>
Updated pres 3 for the actual presentation
</commit_message>
<xml_diff>
--- a/presentation/Pattern Extraction3.pptx
+++ b/presentation/Pattern Extraction3.pptx
@@ -1819,7 +1819,7 @@
           <a:p>
             <a:fld id="{EBACBB57-5019-4C34-B895-9DAC8A1F72A5}" type="datetimeFigureOut">
               <a:rPr lang="fr-CH" smtClean="0"/>
-              <a:t>17.04.2020</a:t>
+              <a:t>21.04.2020</a:t>
             </a:fld>
             <a:endParaRPr lang="fr-CH"/>
           </a:p>
@@ -2505,7 +2505,7 @@
           <a:p>
             <a:fld id="{A1C5EC13-83CD-46FC-A749-A66713452AB8}" type="datetime1">
               <a:rPr lang="fr-CH" smtClean="0"/>
-              <a:t>17.04.2020</a:t>
+              <a:t>21.04.2020</a:t>
             </a:fld>
             <a:endParaRPr lang="fr-CH"/>
           </a:p>
@@ -2692,7 +2692,7 @@
           <a:p>
             <a:fld id="{7E456747-9D74-4D5C-A57B-216C1DCF555B}" type="datetime1">
               <a:rPr lang="fr-CH" smtClean="0"/>
-              <a:t>17.04.2020</a:t>
+              <a:t>21.04.2020</a:t>
             </a:fld>
             <a:endParaRPr lang="fr-CH"/>
           </a:p>
@@ -2872,7 +2872,7 @@
           <a:p>
             <a:fld id="{35AB7460-04F9-4582-9AE7-9E23C393B231}" type="datetime1">
               <a:rPr lang="fr-CH" smtClean="0"/>
-              <a:t>17.04.2020</a:t>
+              <a:t>21.04.2020</a:t>
             </a:fld>
             <a:endParaRPr lang="fr-CH"/>
           </a:p>
@@ -3057,7 +3057,7 @@
           <a:p>
             <a:fld id="{443BA57E-7B21-4F6F-82E1-FF01CD7ABA13}" type="datetime1">
               <a:rPr lang="fr-CH" smtClean="0"/>
-              <a:t>17.04.2020</a:t>
+              <a:t>21.04.2020</a:t>
             </a:fld>
             <a:endParaRPr lang="en-US" dirty="0"/>
           </a:p>
@@ -3875,7 +3875,7 @@
           <a:p>
             <a:fld id="{062309E3-34CC-4F3C-A1BD-713587317DF7}" type="datetime1">
               <a:rPr lang="fr-CH" smtClean="0"/>
-              <a:t>17.04.2020</a:t>
+              <a:t>21.04.2020</a:t>
             </a:fld>
             <a:endParaRPr lang="fr-CH"/>
           </a:p>
@@ -4057,7 +4057,7 @@
           <a:p>
             <a:fld id="{CA50544D-CD99-4DB3-9168-B3A8E20C09FE}" type="datetime1">
               <a:rPr lang="fr-CH" smtClean="0"/>
-              <a:t>17.04.2020</a:t>
+              <a:t>21.04.2020</a:t>
             </a:fld>
             <a:endParaRPr lang="fr-CH"/>
           </a:p>
@@ -4311,7 +4311,7 @@
           <a:p>
             <a:fld id="{0BA05AE5-1ED1-49B1-BD0C-362DD8300DA6}" type="datetime1">
               <a:rPr lang="fr-CH" smtClean="0"/>
-              <a:t>17.04.2020</a:t>
+              <a:t>21.04.2020</a:t>
             </a:fld>
             <a:endParaRPr lang="fr-CH"/>
           </a:p>
@@ -4550,7 +4550,7 @@
           <a:p>
             <a:fld id="{F321FB04-B1F8-410C-91A1-6F9F06ABF9AD}" type="datetime1">
               <a:rPr lang="fr-CH" smtClean="0"/>
-              <a:t>17.04.2020</a:t>
+              <a:t>21.04.2020</a:t>
             </a:fld>
             <a:endParaRPr lang="fr-CH"/>
           </a:p>
@@ -4924,7 +4924,7 @@
           <a:p>
             <a:fld id="{B78CB868-B46E-4481-9B17-F23B1E033C87}" type="datetime1">
               <a:rPr lang="fr-CH" smtClean="0"/>
-              <a:t>17.04.2020</a:t>
+              <a:t>21.04.2020</a:t>
             </a:fld>
             <a:endParaRPr lang="fr-CH"/>
           </a:p>
@@ -5047,7 +5047,7 @@
           <a:p>
             <a:fld id="{AED0E9EF-17A4-4D73-89B5-BE4B97634EE6}" type="datetime1">
               <a:rPr lang="fr-CH" smtClean="0"/>
-              <a:t>17.04.2020</a:t>
+              <a:t>21.04.2020</a:t>
             </a:fld>
             <a:endParaRPr lang="fr-CH"/>
           </a:p>
@@ -5142,7 +5142,7 @@
           <a:p>
             <a:fld id="{185805BF-25D7-407C-8F23-26F91DDF1D3E}" type="datetime1">
               <a:rPr lang="fr-CH" smtClean="0"/>
-              <a:t>17.04.2020</a:t>
+              <a:t>21.04.2020</a:t>
             </a:fld>
             <a:endParaRPr lang="fr-CH"/>
           </a:p>
@@ -5412,7 +5412,7 @@
           <a:p>
             <a:fld id="{159142C7-4527-4223-B0C3-EFB260406640}" type="datetime1">
               <a:rPr lang="fr-CH" smtClean="0"/>
-              <a:t>17.04.2020</a:t>
+              <a:t>21.04.2020</a:t>
             </a:fld>
             <a:endParaRPr lang="fr-CH"/>
           </a:p>
@@ -5684,7 +5684,7 @@
           <a:p>
             <a:fld id="{76BB6D0E-3881-4B3D-96CD-ECBF10879B6D}" type="datetime1">
               <a:rPr lang="fr-CH" smtClean="0"/>
-              <a:t>17.04.2020</a:t>
+              <a:t>21.04.2020</a:t>
             </a:fld>
             <a:endParaRPr lang="fr-CH"/>
           </a:p>
@@ -5989,7 +5989,7 @@
           <a:p>
             <a:fld id="{CE03783F-3525-484F-BB92-A97332512ECC}" type="datetime1">
               <a:rPr lang="fr-CH" smtClean="0"/>
-              <a:t>17.04.2020</a:t>
+              <a:t>21.04.2020</a:t>
             </a:fld>
             <a:endParaRPr lang="fr-CH"/>
           </a:p>
@@ -6198,7 +6198,7 @@
           <a:p>
             <a:fld id="{3DD17AEC-70AF-45C1-A4D8-B9682E9F5690}" type="datetime1">
               <a:rPr lang="fr-CH" smtClean="0"/>
-              <a:t>17.04.2020</a:t>
+              <a:t>21.04.2020</a:t>
             </a:fld>
             <a:endParaRPr lang="fr-CH"/>
           </a:p>
@@ -6512,7 +6512,7 @@
           <a:p>
             <a:fld id="{DD598F42-9E37-44B5-9404-FFDB7BFA3C58}" type="datetime1">
               <a:rPr lang="fr-CH" smtClean="0"/>
-              <a:t>17.04.2020</a:t>
+              <a:t>21.04.2020</a:t>
             </a:fld>
             <a:endParaRPr lang="fr-CH"/>
           </a:p>
@@ -6845,7 +6845,7 @@
           <a:p>
             <a:fld id="{D80A43B4-503F-48B3-9D69-A1E033EB31DC}" type="datetime1">
               <a:rPr lang="fr-CH" smtClean="0"/>
-              <a:t>17.04.2020</a:t>
+              <a:t>21.04.2020</a:t>
             </a:fld>
             <a:endParaRPr lang="fr-CH"/>
           </a:p>
@@ -7159,7 +7159,7 @@
           <a:p>
             <a:fld id="{C63570D4-DC05-4346-960C-EE641E3F13E6}" type="datetime1">
               <a:rPr lang="fr-CH" smtClean="0"/>
-              <a:t>17.04.2020</a:t>
+              <a:t>21.04.2020</a:t>
             </a:fld>
             <a:endParaRPr lang="fr-CH"/>
           </a:p>
@@ -7552,7 +7552,7 @@
           <a:p>
             <a:fld id="{6DAD8BB9-B4F7-4387-B4ED-AABAD1F880A7}" type="datetime1">
               <a:rPr lang="fr-CH" smtClean="0"/>
-              <a:t>17.04.2020</a:t>
+              <a:t>21.04.2020</a:t>
             </a:fld>
             <a:endParaRPr lang="fr-CH"/>
           </a:p>
@@ -7722,7 +7722,7 @@
           <a:p>
             <a:fld id="{5AECCC42-73C7-497A-91BC-5B46DEBB8AEF}" type="datetime1">
               <a:rPr lang="fr-CH" smtClean="0"/>
-              <a:t>17.04.2020</a:t>
+              <a:t>21.04.2020</a:t>
             </a:fld>
             <a:endParaRPr lang="fr-CH"/>
           </a:p>
@@ -7902,7 +7902,7 @@
           <a:p>
             <a:fld id="{24A8B8C1-AC7C-4439-ABE1-977A3F495DB0}" type="datetime1">
               <a:rPr lang="fr-CH" smtClean="0"/>
-              <a:t>17.04.2020</a:t>
+              <a:t>21.04.2020</a:t>
             </a:fld>
             <a:endParaRPr lang="fr-CH"/>
           </a:p>
@@ -8148,7 +8148,7 @@
           <a:p>
             <a:fld id="{8A489873-EBA8-4E74-A188-36791492334D}" type="datetime1">
               <a:rPr lang="fr-CH" smtClean="0"/>
-              <a:t>17.04.2020</a:t>
+              <a:t>21.04.2020</a:t>
             </a:fld>
             <a:endParaRPr lang="fr-CH"/>
           </a:p>
@@ -8387,7 +8387,7 @@
           <a:p>
             <a:fld id="{2716B30A-CC25-498D-A978-F9C8FA3447EC}" type="datetime1">
               <a:rPr lang="fr-CH" smtClean="0"/>
-              <a:t>17.04.2020</a:t>
+              <a:t>21.04.2020</a:t>
             </a:fld>
             <a:endParaRPr lang="fr-CH"/>
           </a:p>
@@ -8761,7 +8761,7 @@
           <a:p>
             <a:fld id="{86F0612F-4B27-4C50-9FEF-D899F02BE98F}" type="datetime1">
               <a:rPr lang="fr-CH" smtClean="0"/>
-              <a:t>17.04.2020</a:t>
+              <a:t>21.04.2020</a:t>
             </a:fld>
             <a:endParaRPr lang="fr-CH"/>
           </a:p>
@@ -8886,7 +8886,7 @@
           <a:p>
             <a:fld id="{1F3DD3EA-FE5E-4B40-AAF2-7BDC6B236448}" type="datetime1">
               <a:rPr lang="fr-CH" smtClean="0"/>
-              <a:t>17.04.2020</a:t>
+              <a:t>21.04.2020</a:t>
             </a:fld>
             <a:endParaRPr lang="fr-CH"/>
           </a:p>
@@ -8981,7 +8981,7 @@
           <a:p>
             <a:fld id="{DFCE601C-520E-4D95-87EA-C15A6C947E77}" type="datetime1">
               <a:rPr lang="fr-CH" smtClean="0"/>
-              <a:t>17.04.2020</a:t>
+              <a:t>21.04.2020</a:t>
             </a:fld>
             <a:endParaRPr lang="fr-CH"/>
           </a:p>
@@ -9258,7 +9258,7 @@
           <a:p>
             <a:fld id="{7CDD90FB-8902-44F1-AFF3-670F9F6ABDF8}" type="datetime1">
               <a:rPr lang="fr-CH" smtClean="0"/>
-              <a:t>17.04.2020</a:t>
+              <a:t>21.04.2020</a:t>
             </a:fld>
             <a:endParaRPr lang="fr-CH"/>
           </a:p>
@@ -9511,7 +9511,7 @@
           <a:p>
             <a:fld id="{6A97B839-6A40-4321-AA7D-D18AFAC76C0E}" type="datetime1">
               <a:rPr lang="fr-CH" smtClean="0"/>
-              <a:t>17.04.2020</a:t>
+              <a:t>21.04.2020</a:t>
             </a:fld>
             <a:endParaRPr lang="fr-CH"/>
           </a:p>
@@ -9724,7 +9724,7 @@
           <a:p>
             <a:fld id="{36C5D13F-9125-4315-B7A7-EB82236C947E}" type="datetime1">
               <a:rPr lang="fr-CH" smtClean="0"/>
-              <a:t>17.04.2020</a:t>
+              <a:t>21.04.2020</a:t>
             </a:fld>
             <a:endParaRPr lang="fr-CH"/>
           </a:p>
@@ -10805,7 +10805,7 @@
           <a:p>
             <a:fld id="{35BA6938-53D0-4653-82AB-3885BCA89A92}" type="datetime1">
               <a:rPr lang="fr-CH" smtClean="0"/>
-              <a:t>17.04.2020</a:t>
+              <a:t>21.04.2020</a:t>
             </a:fld>
             <a:endParaRPr lang="fr-CH"/>
           </a:p>
@@ -12462,8 +12462,8 @@
         </p:nvSpPr>
         <p:spPr>
           <a:xfrm>
-            <a:off x="6373268" y="1016907"/>
-            <a:ext cx="4822923" cy="369332"/>
+            <a:off x="6143440" y="1016907"/>
+            <a:ext cx="5570756" cy="338554"/>
           </a:xfrm>
           <a:prstGeom prst="rect">
             <a:avLst/>
@@ -12477,10 +12477,14 @@
           <a:lstStyle/>
           <a:p>
             <a:r>
-              <a:rPr lang="fr-CH" dirty="0" smtClean="0"/>
+              <a:rPr lang="fr-CH" sz="1600" dirty="0" smtClean="0">
+                <a:latin typeface="Consolas" panose="020B0609020204030204" pitchFamily="49" charset="0"/>
+              </a:rPr>
               <a:t>git clone https://github.com/Alamofire/Alamofire</a:t>
             </a:r>
-            <a:endParaRPr lang="fr-CH" dirty="0"/>
+            <a:endParaRPr lang="fr-CH" sz="1600" dirty="0">
+              <a:latin typeface="Consolas" panose="020B0609020204030204" pitchFamily="49" charset="0"/>
+            </a:endParaRPr>
           </a:p>
         </p:txBody>
       </p:sp>
@@ -12930,86 +12934,6 @@
       </p:sp>
       <p:sp>
         <p:nvSpPr>
-          <p:cNvPr id="3" name="Espace réservé du contenu 2"/>
-          <p:cNvSpPr>
-            <a:spLocks noGrp="1"/>
-          </p:cNvSpPr>
-          <p:nvPr>
-            <p:ph idx="1"/>
-          </p:nvPr>
-        </p:nvSpPr>
-        <p:spPr/>
-        <p:txBody>
-          <a:bodyPr/>
-          <a:lstStyle/>
-          <a:p>
-            <a:r>
-              <a:rPr lang="fr-CH" dirty="0" err="1" smtClean="0"/>
-              <a:t>Checkout</a:t>
-            </a:r>
-            <a:r>
-              <a:rPr lang="fr-CH" dirty="0" smtClean="0"/>
-              <a:t> </a:t>
-            </a:r>
-            <a:r>
-              <a:rPr lang="fr-CH" dirty="0" err="1" smtClean="0"/>
-              <a:t>commits</a:t>
-            </a:r>
-            <a:endParaRPr lang="fr-CH" dirty="0" smtClean="0"/>
-          </a:p>
-          <a:p>
-            <a:r>
-              <a:rPr lang="fr-CH" dirty="0" err="1" smtClean="0"/>
-              <a:t>Renamed</a:t>
-            </a:r>
-            <a:r>
-              <a:rPr lang="fr-CH" dirty="0" smtClean="0"/>
-              <a:t> files in commit </a:t>
-            </a:r>
-            <a:r>
-              <a:rPr lang="fr-CH" dirty="0" err="1" smtClean="0"/>
-              <a:t>history</a:t>
-            </a:r>
-            <a:endParaRPr lang="fr-CH" dirty="0" smtClean="0"/>
-          </a:p>
-          <a:p>
-            <a:r>
-              <a:rPr lang="fr-CH" dirty="0" err="1" smtClean="0"/>
-              <a:t>Syntax</a:t>
-            </a:r>
-            <a:r>
-              <a:rPr lang="fr-CH" dirty="0" smtClean="0"/>
-              <a:t> </a:t>
-            </a:r>
-            <a:r>
-              <a:rPr lang="fr-CH" dirty="0" err="1" smtClean="0"/>
-              <a:t>error</a:t>
-            </a:r>
-            <a:r>
-              <a:rPr lang="fr-CH" dirty="0" smtClean="0"/>
-              <a:t> </a:t>
-            </a:r>
-            <a:r>
-              <a:rPr lang="fr-CH" dirty="0" err="1" smtClean="0"/>
-              <a:t>according</a:t>
-            </a:r>
-            <a:r>
-              <a:rPr lang="fr-CH" dirty="0" smtClean="0"/>
-              <a:t> to </a:t>
-            </a:r>
-            <a:r>
-              <a:rPr lang="fr-CH" dirty="0" err="1" smtClean="0"/>
-              <a:t>swift-ast</a:t>
-            </a:r>
-            <a:endParaRPr lang="fr-CH" dirty="0" smtClean="0"/>
-          </a:p>
-          <a:p>
-            <a:endParaRPr lang="fr-CH" dirty="0"/>
-          </a:p>
-        </p:txBody>
-      </p:sp>
-      <p:sp>
-        <p:nvSpPr>
           <p:cNvPr id="4" name="Espace réservé du numéro de diapositive 3"/>
           <p:cNvSpPr>
             <a:spLocks noGrp="1"/>
@@ -13028,6 +12952,227 @@
               <a:t>7</a:t>
             </a:fld>
             <a:endParaRPr lang="fr-CH"/>
+          </a:p>
+        </p:txBody>
+      </p:sp>
+      <p:pic>
+        <p:nvPicPr>
+          <p:cNvPr id="6" name="Image 5"/>
+          <p:cNvPicPr>
+            <a:picLocks noChangeAspect="1"/>
+          </p:cNvPicPr>
+          <p:nvPr/>
+        </p:nvPicPr>
+        <p:blipFill>
+          <a:blip r:embed="rId2"/>
+          <a:stretch>
+            <a:fillRect/>
+          </a:stretch>
+        </p:blipFill>
+        <p:spPr>
+          <a:xfrm>
+            <a:off x="2893454" y="2821741"/>
+            <a:ext cx="651819" cy="816976"/>
+          </a:xfrm>
+          <a:prstGeom prst="rect">
+            <a:avLst/>
+          </a:prstGeom>
+        </p:spPr>
+      </p:pic>
+      <p:pic>
+        <p:nvPicPr>
+          <p:cNvPr id="7" name="Image 6"/>
+          <p:cNvPicPr>
+            <a:picLocks noChangeAspect="1"/>
+          </p:cNvPicPr>
+          <p:nvPr/>
+        </p:nvPicPr>
+        <p:blipFill>
+          <a:blip r:embed="rId3"/>
+          <a:stretch>
+            <a:fillRect/>
+          </a:stretch>
+        </p:blipFill>
+        <p:spPr>
+          <a:xfrm>
+            <a:off x="5623697" y="2821741"/>
+            <a:ext cx="875528" cy="661113"/>
+          </a:xfrm>
+          <a:prstGeom prst="rect">
+            <a:avLst/>
+          </a:prstGeom>
+        </p:spPr>
+      </p:pic>
+      <p:pic>
+        <p:nvPicPr>
+          <p:cNvPr id="1026" name="Picture 2" descr="http://icons.iconarchive.com/icons/icons8/windows-8/128/Programming-Error-icon.png"/>
+          <p:cNvPicPr>
+            <a:picLocks noChangeAspect="1" noChangeArrowheads="1"/>
+          </p:cNvPicPr>
+          <p:nvPr/>
+        </p:nvPicPr>
+        <p:blipFill>
+          <a:blip r:embed="rId4">
+            <a:extLst>
+              <a:ext uri="{28A0092B-C50C-407E-A947-70E740481C1C}">
+                <a14:useLocalDpi xmlns:a14="http://schemas.microsoft.com/office/drawing/2010/main" val="0"/>
+              </a:ext>
+            </a:extLst>
+          </a:blip>
+          <a:srcRect/>
+          <a:stretch>
+            <a:fillRect/>
+          </a:stretch>
+        </p:blipFill>
+        <p:spPr bwMode="auto">
+          <a:xfrm>
+            <a:off x="8577649" y="2842442"/>
+            <a:ext cx="775572" cy="775573"/>
+          </a:xfrm>
+          <a:prstGeom prst="rect">
+            <a:avLst/>
+          </a:prstGeom>
+          <a:noFill/>
+          <a:extLst>
+            <a:ext uri="{909E8E84-426E-40DD-AFC4-6F175D3DCCD1}">
+              <a14:hiddenFill xmlns:a14="http://schemas.microsoft.com/office/drawing/2010/main">
+                <a:solidFill>
+                  <a:srgbClr val="FFFFFF"/>
+                </a:solidFill>
+              </a14:hiddenFill>
+            </a:ext>
+          </a:extLst>
+        </p:spPr>
+      </p:pic>
+      <p:sp>
+        <p:nvSpPr>
+          <p:cNvPr id="8" name="ZoneTexte 7"/>
+          <p:cNvSpPr txBox="1"/>
+          <p:nvPr/>
+        </p:nvSpPr>
+        <p:spPr>
+          <a:xfrm>
+            <a:off x="2259837" y="4144168"/>
+            <a:ext cx="1919051" cy="369332"/>
+          </a:xfrm>
+          <a:prstGeom prst="rect">
+            <a:avLst/>
+          </a:prstGeom>
+          <a:noFill/>
+        </p:spPr>
+        <p:txBody>
+          <a:bodyPr wrap="none" rtlCol="0">
+            <a:spAutoFit/>
+          </a:bodyPr>
+          <a:lstStyle/>
+          <a:p>
+            <a:pPr algn="ctr"/>
+            <a:r>
+              <a:rPr lang="fr-CH" dirty="0" err="1"/>
+              <a:t>Checkout</a:t>
+            </a:r>
+            <a:r>
+              <a:rPr lang="fr-CH" dirty="0"/>
+              <a:t> </a:t>
+            </a:r>
+            <a:r>
+              <a:rPr lang="fr-CH" dirty="0" err="1" smtClean="0"/>
+              <a:t>commits</a:t>
+            </a:r>
+            <a:endParaRPr lang="fr-CH" dirty="0"/>
+          </a:p>
+        </p:txBody>
+      </p:sp>
+      <p:sp>
+        <p:nvSpPr>
+          <p:cNvPr id="9" name="ZoneTexte 8"/>
+          <p:cNvSpPr txBox="1"/>
+          <p:nvPr/>
+        </p:nvSpPr>
+        <p:spPr>
+          <a:xfrm>
+            <a:off x="5142942" y="4005669"/>
+            <a:ext cx="1837037" cy="646331"/>
+          </a:xfrm>
+          <a:prstGeom prst="rect">
+            <a:avLst/>
+          </a:prstGeom>
+          <a:noFill/>
+        </p:spPr>
+        <p:txBody>
+          <a:bodyPr wrap="square" rtlCol="0">
+            <a:spAutoFit/>
+          </a:bodyPr>
+          <a:lstStyle/>
+          <a:p>
+            <a:pPr algn="ctr"/>
+            <a:r>
+              <a:rPr lang="fr-CH" dirty="0" err="1"/>
+              <a:t>Renamed</a:t>
+            </a:r>
+            <a:r>
+              <a:rPr lang="fr-CH" dirty="0"/>
+              <a:t> files in commit </a:t>
+            </a:r>
+            <a:r>
+              <a:rPr lang="fr-CH" dirty="0" err="1" smtClean="0"/>
+              <a:t>history</a:t>
+            </a:r>
+            <a:endParaRPr lang="fr-CH" dirty="0"/>
+          </a:p>
+        </p:txBody>
+      </p:sp>
+      <p:sp>
+        <p:nvSpPr>
+          <p:cNvPr id="10" name="Rectangle 9"/>
+          <p:cNvSpPr/>
+          <p:nvPr/>
+        </p:nvSpPr>
+        <p:spPr>
+          <a:xfrm>
+            <a:off x="7843547" y="4005330"/>
+            <a:ext cx="2243776" cy="646331"/>
+          </a:xfrm>
+          <a:prstGeom prst="rect">
+            <a:avLst/>
+          </a:prstGeom>
+        </p:spPr>
+        <p:txBody>
+          <a:bodyPr wrap="square">
+            <a:spAutoFit/>
+          </a:bodyPr>
+          <a:lstStyle/>
+          <a:p>
+            <a:pPr algn="ctr"/>
+            <a:r>
+              <a:rPr lang="fr-CH" dirty="0" err="1"/>
+              <a:t>Syntax</a:t>
+            </a:r>
+            <a:r>
+              <a:rPr lang="fr-CH" dirty="0"/>
+              <a:t> </a:t>
+            </a:r>
+            <a:r>
+              <a:rPr lang="fr-CH" dirty="0" err="1"/>
+              <a:t>error</a:t>
+            </a:r>
+            <a:r>
+              <a:rPr lang="fr-CH" dirty="0"/>
+              <a:t> </a:t>
+            </a:r>
+            <a:r>
+              <a:rPr lang="fr-CH" dirty="0" err="1"/>
+              <a:t>according</a:t>
+            </a:r>
+            <a:r>
+              <a:rPr lang="fr-CH" dirty="0"/>
+              <a:t> to </a:t>
+            </a:r>
+            <a:r>
+              <a:rPr lang="fr-CH" dirty="0" err="1"/>
+              <a:t>swift-ast</a:t>
+            </a:r>
+            <a:endParaRPr lang="fr-CH" dirty="0"/>
           </a:p>
         </p:txBody>
       </p:sp>
@@ -13041,6 +13186,13 @@
   <p:clrMapOvr>
     <a:masterClrMapping/>
   </p:clrMapOvr>
+  <p:timing>
+    <p:tnLst>
+      <p:par>
+        <p:cTn id="1" dur="indefinite" restart="never" nodeType="tmRoot"/>
+      </p:par>
+    </p:tnLst>
+  </p:timing>
 </p:sld>
 </file>
 

</xml_diff>